<commit_message>
Journal figures are updated to v4.
</commit_message>
<xml_diff>
--- a/Test-Result/2021.04.15/WPT-motor.pptx
+++ b/Test-Result/2021.04.15/WPT-motor.pptx
@@ -8,6 +8,10 @@
     <p:sldId id="258" r:id="rId2"/>
     <p:sldId id="256" r:id="rId3"/>
     <p:sldId id="257" r:id="rId4"/>
+    <p:sldId id="259" r:id="rId5"/>
+    <p:sldId id="262" r:id="rId6"/>
+    <p:sldId id="260" r:id="rId7"/>
+    <p:sldId id="261" r:id="rId8"/>
   </p:sldIdLst>
   <p:sldSz cx="12192000" cy="6858000"/>
   <p:notesSz cx="6858000" cy="9144000"/>
@@ -106,6 +110,11 @@
       </a:defRPr>
     </a:lvl9pPr>
   </p:defaultTextStyle>
+  <p:extLst>
+    <p:ext uri="{EFAFB233-063F-42B5-8137-9DF3F51BA10A}">
+      <p15:sldGuideLst xmlns:p15="http://schemas.microsoft.com/office/powerpoint/2012/main"/>
+    </p:ext>
+  </p:extLst>
 </p:presentation>
 </file>
 
@@ -256,7 +265,7 @@
           <a:p>
             <a:fld id="{7F6C451C-F085-483A-9A3C-F0DD68BA6070}" type="datetimeFigureOut">
               <a:rPr lang="en-US" smtClean="0"/>
-              <a:t>4/15/2021</a:t>
+              <a:t>4/20/2021</a:t>
             </a:fld>
             <a:endParaRPr lang="en-US"/>
           </a:p>
@@ -454,7 +463,7 @@
           <a:p>
             <a:fld id="{7F6C451C-F085-483A-9A3C-F0DD68BA6070}" type="datetimeFigureOut">
               <a:rPr lang="en-US" smtClean="0"/>
-              <a:t>4/15/2021</a:t>
+              <a:t>4/20/2021</a:t>
             </a:fld>
             <a:endParaRPr lang="en-US"/>
           </a:p>
@@ -662,7 +671,7 @@
           <a:p>
             <a:fld id="{7F6C451C-F085-483A-9A3C-F0DD68BA6070}" type="datetimeFigureOut">
               <a:rPr lang="en-US" smtClean="0"/>
-              <a:t>4/15/2021</a:t>
+              <a:t>4/20/2021</a:t>
             </a:fld>
             <a:endParaRPr lang="en-US"/>
           </a:p>
@@ -860,7 +869,7 @@
           <a:p>
             <a:fld id="{7F6C451C-F085-483A-9A3C-F0DD68BA6070}" type="datetimeFigureOut">
               <a:rPr lang="en-US" smtClean="0"/>
-              <a:t>4/15/2021</a:t>
+              <a:t>4/20/2021</a:t>
             </a:fld>
             <a:endParaRPr lang="en-US"/>
           </a:p>
@@ -1135,7 +1144,7 @@
           <a:p>
             <a:fld id="{7F6C451C-F085-483A-9A3C-F0DD68BA6070}" type="datetimeFigureOut">
               <a:rPr lang="en-US" smtClean="0"/>
-              <a:t>4/15/2021</a:t>
+              <a:t>4/20/2021</a:t>
             </a:fld>
             <a:endParaRPr lang="en-US"/>
           </a:p>
@@ -1400,7 +1409,7 @@
           <a:p>
             <a:fld id="{7F6C451C-F085-483A-9A3C-F0DD68BA6070}" type="datetimeFigureOut">
               <a:rPr lang="en-US" smtClean="0"/>
-              <a:t>4/15/2021</a:t>
+              <a:t>4/20/2021</a:t>
             </a:fld>
             <a:endParaRPr lang="en-US"/>
           </a:p>
@@ -1812,7 +1821,7 @@
           <a:p>
             <a:fld id="{7F6C451C-F085-483A-9A3C-F0DD68BA6070}" type="datetimeFigureOut">
               <a:rPr lang="en-US" smtClean="0"/>
-              <a:t>4/15/2021</a:t>
+              <a:t>4/20/2021</a:t>
             </a:fld>
             <a:endParaRPr lang="en-US"/>
           </a:p>
@@ -1953,7 +1962,7 @@
           <a:p>
             <a:fld id="{7F6C451C-F085-483A-9A3C-F0DD68BA6070}" type="datetimeFigureOut">
               <a:rPr lang="en-US" smtClean="0"/>
-              <a:t>4/15/2021</a:t>
+              <a:t>4/20/2021</a:t>
             </a:fld>
             <a:endParaRPr lang="en-US"/>
           </a:p>
@@ -2066,7 +2075,7 @@
           <a:p>
             <a:fld id="{7F6C451C-F085-483A-9A3C-F0DD68BA6070}" type="datetimeFigureOut">
               <a:rPr lang="en-US" smtClean="0"/>
-              <a:t>4/15/2021</a:t>
+              <a:t>4/20/2021</a:t>
             </a:fld>
             <a:endParaRPr lang="en-US"/>
           </a:p>
@@ -2377,7 +2386,7 @@
           <a:p>
             <a:fld id="{7F6C451C-F085-483A-9A3C-F0DD68BA6070}" type="datetimeFigureOut">
               <a:rPr lang="en-US" smtClean="0"/>
-              <a:t>4/15/2021</a:t>
+              <a:t>4/20/2021</a:t>
             </a:fld>
             <a:endParaRPr lang="en-US"/>
           </a:p>
@@ -2665,7 +2674,7 @@
           <a:p>
             <a:fld id="{7F6C451C-F085-483A-9A3C-F0DD68BA6070}" type="datetimeFigureOut">
               <a:rPr lang="en-US" smtClean="0"/>
-              <a:t>4/15/2021</a:t>
+              <a:t>4/20/2021</a:t>
             </a:fld>
             <a:endParaRPr lang="en-US"/>
           </a:p>
@@ -2906,7 +2915,7 @@
           <a:p>
             <a:fld id="{7F6C451C-F085-483A-9A3C-F0DD68BA6070}" type="datetimeFigureOut">
               <a:rPr lang="en-US" smtClean="0"/>
-              <a:t>4/15/2021</a:t>
+              <a:t>4/20/2021</a:t>
             </a:fld>
             <a:endParaRPr lang="en-US"/>
           </a:p>
@@ -3359,8 +3368,8 @@
           </a:prstGeom>
         </p:spPr>
       </p:pic>
-      <mc:AlternateContent xmlns:mc="http://schemas.openxmlformats.org/markup-compatibility/2006">
-        <mc:Choice xmlns:a14="http://schemas.microsoft.com/office/drawing/2010/main" Requires="a14">
+      <mc:AlternateContent xmlns:mc="http://schemas.openxmlformats.org/markup-compatibility/2006" xmlns:a14="http://schemas.microsoft.com/office/drawing/2010/main">
+        <mc:Choice Requires="a14">
           <p:sp>
             <p:nvSpPr>
               <p:cNvPr id="13" name="Rectangle 12">
@@ -3418,7 +3427,7 @@
                       <m:sSub>
                         <m:sSubPr>
                           <m:ctrlPr>
-                            <a:rPr lang="en-US" sz="2000" b="1" smtClean="0">
+                            <a:rPr lang="en-US" sz="2000" b="1" i="1" smtClean="0">
                               <a:solidFill>
                                 <a:schemeClr val="tx1"/>
                               </a:solidFill>
@@ -3466,7 +3475,7 @@
             </p:txBody>
           </p:sp>
         </mc:Choice>
-        <mc:Fallback>
+        <mc:Fallback xmlns="">
           <p:sp>
             <p:nvSpPr>
               <p:cNvPr id="13" name="Rectangle 12">
@@ -3516,8 +3525,8 @@
           </p:sp>
         </mc:Fallback>
       </mc:AlternateContent>
-      <mc:AlternateContent xmlns:mc="http://schemas.openxmlformats.org/markup-compatibility/2006">
-        <mc:Choice xmlns:a14="http://schemas.microsoft.com/office/drawing/2010/main" Requires="a14">
+      <mc:AlternateContent xmlns:mc="http://schemas.openxmlformats.org/markup-compatibility/2006" xmlns:a14="http://schemas.microsoft.com/office/drawing/2010/main">
+        <mc:Choice Requires="a14">
           <p:sp>
             <p:nvSpPr>
               <p:cNvPr id="18" name="Rectangle 17">
@@ -3573,7 +3582,7 @@
                       <m:sSub>
                         <m:sSubPr>
                           <m:ctrlPr>
-                            <a:rPr lang="en-US" sz="2000" b="1" smtClean="0">
+                            <a:rPr lang="en-US" sz="2000" b="1" i="1" smtClean="0">
                               <a:solidFill>
                                 <a:schemeClr val="tx1"/>
                               </a:solidFill>
@@ -3621,7 +3630,7 @@
             </p:txBody>
           </p:sp>
         </mc:Choice>
-        <mc:Fallback>
+        <mc:Fallback xmlns="">
           <p:sp>
             <p:nvSpPr>
               <p:cNvPr id="18" name="Rectangle 17">
@@ -3669,8 +3678,8 @@
           </p:sp>
         </mc:Fallback>
       </mc:AlternateContent>
-      <mc:AlternateContent xmlns:mc="http://schemas.openxmlformats.org/markup-compatibility/2006">
-        <mc:Choice xmlns:a14="http://schemas.microsoft.com/office/drawing/2010/main" Requires="a14">
+      <mc:AlternateContent xmlns:mc="http://schemas.openxmlformats.org/markup-compatibility/2006" xmlns:a14="http://schemas.microsoft.com/office/drawing/2010/main">
+        <mc:Choice Requires="a14">
           <p:sp>
             <p:nvSpPr>
               <p:cNvPr id="19" name="Rectangle 18">
@@ -3726,7 +3735,7 @@
                       <m:sSub>
                         <m:sSubPr>
                           <m:ctrlPr>
-                            <a:rPr lang="en-US" sz="2000" b="1" smtClean="0">
+                            <a:rPr lang="en-US" sz="2000" b="1" i="1" smtClean="0">
                               <a:solidFill>
                                 <a:schemeClr val="tx1"/>
                               </a:solidFill>
@@ -3774,7 +3783,7 @@
             </p:txBody>
           </p:sp>
         </mc:Choice>
-        <mc:Fallback>
+        <mc:Fallback xmlns="">
           <p:sp>
             <p:nvSpPr>
               <p:cNvPr id="19" name="Rectangle 18">
@@ -4020,8 +4029,8 @@
           </a:prstGeom>
         </p:spPr>
       </p:pic>
-      <mc:AlternateContent xmlns:mc="http://schemas.openxmlformats.org/markup-compatibility/2006">
-        <mc:Choice xmlns:a14="http://schemas.microsoft.com/office/drawing/2010/main" Requires="a14">
+      <mc:AlternateContent xmlns:mc="http://schemas.openxmlformats.org/markup-compatibility/2006" xmlns:a14="http://schemas.microsoft.com/office/drawing/2010/main">
+        <mc:Choice Requires="a14">
           <p:sp>
             <p:nvSpPr>
               <p:cNvPr id="6" name="Rectangle 5">
@@ -4077,7 +4086,7 @@
                       <m:sSub>
                         <m:sSubPr>
                           <m:ctrlPr>
-                            <a:rPr lang="en-US" sz="2000" b="1" smtClean="0">
+                            <a:rPr lang="en-US" sz="2000" b="1" i="1" smtClean="0">
                               <a:solidFill>
                                 <a:schemeClr val="tx1"/>
                               </a:solidFill>
@@ -4125,7 +4134,7 @@
             </p:txBody>
           </p:sp>
         </mc:Choice>
-        <mc:Fallback>
+        <mc:Fallback xmlns="">
           <p:sp>
             <p:nvSpPr>
               <p:cNvPr id="6" name="Rectangle 5">
@@ -4217,8 +4226,8 @@
           </a:fontRef>
         </p:style>
       </p:cxnSp>
-      <mc:AlternateContent xmlns:mc="http://schemas.openxmlformats.org/markup-compatibility/2006">
-        <mc:Choice xmlns:a14="http://schemas.microsoft.com/office/drawing/2010/main" Requires="a14">
+      <mc:AlternateContent xmlns:mc="http://schemas.openxmlformats.org/markup-compatibility/2006" xmlns:a14="http://schemas.microsoft.com/office/drawing/2010/main">
+        <mc:Choice Requires="a14">
           <p:sp>
             <p:nvSpPr>
               <p:cNvPr id="8" name="Rectangle 7">
@@ -4274,7 +4283,7 @@
                       <m:sSub>
                         <m:sSubPr>
                           <m:ctrlPr>
-                            <a:rPr lang="en-US" sz="2000" b="1" smtClean="0">
+                            <a:rPr lang="en-US" sz="2000" b="1" i="1" smtClean="0">
                               <a:solidFill>
                                 <a:schemeClr val="tx1"/>
                               </a:solidFill>
@@ -4322,7 +4331,7 @@
             </p:txBody>
           </p:sp>
         </mc:Choice>
-        <mc:Fallback>
+        <mc:Fallback xmlns="">
           <p:sp>
             <p:nvSpPr>
               <p:cNvPr id="8" name="Rectangle 7">
@@ -4480,8 +4489,8 @@
           </a:prstGeom>
         </p:spPr>
       </p:pic>
-      <mc:AlternateContent xmlns:mc="http://schemas.openxmlformats.org/markup-compatibility/2006">
-        <mc:Choice xmlns:a14="http://schemas.microsoft.com/office/drawing/2010/main" Requires="a14">
+      <mc:AlternateContent xmlns:mc="http://schemas.openxmlformats.org/markup-compatibility/2006" xmlns:a14="http://schemas.microsoft.com/office/drawing/2010/main">
+        <mc:Choice Requires="a14">
           <p:sp>
             <p:nvSpPr>
               <p:cNvPr id="4" name="Rectangle 3">
@@ -4537,7 +4546,7 @@
                       <m:sSub>
                         <m:sSubPr>
                           <m:ctrlPr>
-                            <a:rPr lang="en-US" sz="2000" b="1" smtClean="0">
+                            <a:rPr lang="en-US" sz="2000" b="1" i="1" smtClean="0">
                               <a:solidFill>
                                 <a:schemeClr val="tx1"/>
                               </a:solidFill>
@@ -4585,7 +4594,7 @@
             </p:txBody>
           </p:sp>
         </mc:Choice>
-        <mc:Fallback>
+        <mc:Fallback xmlns="">
           <p:sp>
             <p:nvSpPr>
               <p:cNvPr id="4" name="Rectangle 3">
@@ -4677,8 +4686,8 @@
           </a:fontRef>
         </p:style>
       </p:cxnSp>
-      <mc:AlternateContent xmlns:mc="http://schemas.openxmlformats.org/markup-compatibility/2006">
-        <mc:Choice xmlns:a14="http://schemas.microsoft.com/office/drawing/2010/main" Requires="a14">
+      <mc:AlternateContent xmlns:mc="http://schemas.openxmlformats.org/markup-compatibility/2006" xmlns:a14="http://schemas.microsoft.com/office/drawing/2010/main">
+        <mc:Choice Requires="a14">
           <p:sp>
             <p:nvSpPr>
               <p:cNvPr id="6" name="Rectangle 5">
@@ -4734,7 +4743,7 @@
                       <m:sSub>
                         <m:sSubPr>
                           <m:ctrlPr>
-                            <a:rPr lang="en-US" sz="2000" b="1" smtClean="0">
+                            <a:rPr lang="en-US" sz="2000" b="1" i="1" smtClean="0">
                               <a:solidFill>
                                 <a:schemeClr val="tx1"/>
                               </a:solidFill>
@@ -4782,7 +4791,7 @@
             </p:txBody>
           </p:sp>
         </mc:Choice>
-        <mc:Fallback>
+        <mc:Fallback xmlns="">
           <p:sp>
             <p:nvSpPr>
               <p:cNvPr id="6" name="Rectangle 5">
@@ -4874,8 +4883,8 @@
           </a:fontRef>
         </p:style>
       </p:cxnSp>
-      <mc:AlternateContent xmlns:mc="http://schemas.openxmlformats.org/markup-compatibility/2006">
-        <mc:Choice xmlns:a14="http://schemas.microsoft.com/office/drawing/2010/main" Requires="a14">
+      <mc:AlternateContent xmlns:mc="http://schemas.openxmlformats.org/markup-compatibility/2006" xmlns:a14="http://schemas.microsoft.com/office/drawing/2010/main">
+        <mc:Choice Requires="a14">
           <p:sp>
             <p:nvSpPr>
               <p:cNvPr id="8" name="Rectangle 7">
@@ -4931,7 +4940,7 @@
                       <m:sSub>
                         <m:sSubPr>
                           <m:ctrlPr>
-                            <a:rPr lang="en-US" sz="2000" b="1" smtClean="0">
+                            <a:rPr lang="en-US" sz="2000" b="1" i="1" smtClean="0">
                               <a:solidFill>
                                 <a:schemeClr val="tx1"/>
                               </a:solidFill>
@@ -4979,7 +4988,7 @@
             </p:txBody>
           </p:sp>
         </mc:Choice>
-        <mc:Fallback>
+        <mc:Fallback xmlns="">
           <p:sp>
             <p:nvSpPr>
               <p:cNvPr id="8" name="Rectangle 7">
@@ -5071,8 +5080,8 @@
           </a:fontRef>
         </p:style>
       </p:cxnSp>
-      <mc:AlternateContent xmlns:mc="http://schemas.openxmlformats.org/markup-compatibility/2006">
-        <mc:Choice xmlns:a14="http://schemas.microsoft.com/office/drawing/2010/main" Requires="a14">
+      <mc:AlternateContent xmlns:mc="http://schemas.openxmlformats.org/markup-compatibility/2006" xmlns:a14="http://schemas.microsoft.com/office/drawing/2010/main">
+        <mc:Choice Requires="a14">
           <p:sp>
             <p:nvSpPr>
               <p:cNvPr id="11" name="Rectangle 10">
@@ -5128,7 +5137,7 @@
                       <m:sSub>
                         <m:sSubPr>
                           <m:ctrlPr>
-                            <a:rPr lang="en-US" sz="2000" b="1" smtClean="0">
+                            <a:rPr lang="en-US" sz="2000" b="1" i="1" smtClean="0">
                               <a:solidFill>
                                 <a:schemeClr val="tx1"/>
                               </a:solidFill>
@@ -5176,7 +5185,7 @@
             </p:txBody>
           </p:sp>
         </mc:Choice>
-        <mc:Fallback>
+        <mc:Fallback xmlns="">
           <p:sp>
             <p:nvSpPr>
               <p:cNvPr id="11" name="Rectangle 10">
@@ -5272,6 +5281,341 @@
     <p:extLst>
       <p:ext uri="{BB962C8B-B14F-4D97-AF65-F5344CB8AC3E}">
         <p14:creationId xmlns:p14="http://schemas.microsoft.com/office/powerpoint/2010/main" val="3544178455"/>
+      </p:ext>
+    </p:extLst>
+  </p:cSld>
+  <p:clrMapOvr>
+    <a:masterClrMapping/>
+  </p:clrMapOvr>
+</p:sld>
+</file>
+
+<file path=ppt/slides/slide4.xml><?xml version="1.0" encoding="utf-8"?>
+<p:sld xmlns:a="http://schemas.openxmlformats.org/drawingml/2006/main" xmlns:r="http://schemas.openxmlformats.org/officeDocument/2006/relationships" xmlns:p="http://schemas.openxmlformats.org/presentationml/2006/main">
+  <p:cSld>
+    <p:spTree>
+      <p:nvGrpSpPr>
+        <p:cNvPr id="1" name=""/>
+        <p:cNvGrpSpPr/>
+        <p:nvPr/>
+      </p:nvGrpSpPr>
+      <p:grpSpPr>
+        <a:xfrm>
+          <a:off x="0" y="0"/>
+          <a:ext cx="0" cy="0"/>
+          <a:chOff x="0" y="0"/>
+          <a:chExt cx="0" cy="0"/>
+        </a:xfrm>
+      </p:grpSpPr>
+      <p:pic>
+        <p:nvPicPr>
+          <p:cNvPr id="5" name="Picture 4">
+            <a:extLst>
+              <a:ext uri="{FF2B5EF4-FFF2-40B4-BE49-F238E27FC236}">
+                <a16:creationId xmlns:a16="http://schemas.microsoft.com/office/drawing/2014/main" id="{077D07AC-3E66-455B-A18E-57EFC334FF0F}"/>
+              </a:ext>
+            </a:extLst>
+          </p:cNvPr>
+          <p:cNvPicPr>
+            <a:picLocks noChangeAspect="1"/>
+          </p:cNvPicPr>
+          <p:nvPr/>
+        </p:nvPicPr>
+        <p:blipFill>
+          <a:blip r:embed="rId2">
+            <a:extLst>
+              <a:ext uri="{28A0092B-C50C-407E-A947-70E740481C1C}">
+                <a14:useLocalDpi xmlns:a14="http://schemas.microsoft.com/office/drawing/2010/main" val="0"/>
+              </a:ext>
+            </a:extLst>
+          </a:blip>
+          <a:stretch>
+            <a:fillRect/>
+          </a:stretch>
+        </p:blipFill>
+        <p:spPr>
+          <a:xfrm>
+            <a:off x="381000" y="1042987"/>
+            <a:ext cx="11430000" cy="4772025"/>
+          </a:xfrm>
+          <a:prstGeom prst="rect">
+            <a:avLst/>
+          </a:prstGeom>
+        </p:spPr>
+      </p:pic>
+    </p:spTree>
+    <p:extLst>
+      <p:ext uri="{BB962C8B-B14F-4D97-AF65-F5344CB8AC3E}">
+        <p14:creationId xmlns:p14="http://schemas.microsoft.com/office/powerpoint/2010/main" val="856926114"/>
+      </p:ext>
+    </p:extLst>
+  </p:cSld>
+  <p:clrMapOvr>
+    <a:masterClrMapping/>
+  </p:clrMapOvr>
+</p:sld>
+</file>
+
+<file path=ppt/slides/slide5.xml><?xml version="1.0" encoding="utf-8"?>
+<p:sld xmlns:a="http://schemas.openxmlformats.org/drawingml/2006/main" xmlns:r="http://schemas.openxmlformats.org/officeDocument/2006/relationships" xmlns:p="http://schemas.openxmlformats.org/presentationml/2006/main">
+  <p:cSld>
+    <p:spTree>
+      <p:nvGrpSpPr>
+        <p:cNvPr id="1" name=""/>
+        <p:cNvGrpSpPr/>
+        <p:nvPr/>
+      </p:nvGrpSpPr>
+      <p:grpSpPr>
+        <a:xfrm>
+          <a:off x="0" y="0"/>
+          <a:ext cx="0" cy="0"/>
+          <a:chOff x="0" y="0"/>
+          <a:chExt cx="0" cy="0"/>
+        </a:xfrm>
+      </p:grpSpPr>
+      <p:pic>
+        <p:nvPicPr>
+          <p:cNvPr id="5" name="Picture 4">
+            <a:extLst>
+              <a:ext uri="{FF2B5EF4-FFF2-40B4-BE49-F238E27FC236}">
+                <a16:creationId xmlns:a16="http://schemas.microsoft.com/office/drawing/2014/main" id="{1E027EE3-B5D8-46B0-B937-70BB8D72066B}"/>
+              </a:ext>
+            </a:extLst>
+          </p:cNvPr>
+          <p:cNvPicPr>
+            <a:picLocks noChangeAspect="1"/>
+          </p:cNvPicPr>
+          <p:nvPr/>
+        </p:nvPicPr>
+        <p:blipFill>
+          <a:blip r:embed="rId2">
+            <a:extLst>
+              <a:ext uri="{28A0092B-C50C-407E-A947-70E740481C1C}">
+                <a14:useLocalDpi xmlns:a14="http://schemas.microsoft.com/office/drawing/2010/main" val="0"/>
+              </a:ext>
+            </a:extLst>
+          </a:blip>
+          <a:stretch>
+            <a:fillRect/>
+          </a:stretch>
+        </p:blipFill>
+        <p:spPr>
+          <a:xfrm>
+            <a:off x="381000" y="1042987"/>
+            <a:ext cx="11430000" cy="4772025"/>
+          </a:xfrm>
+          <a:prstGeom prst="rect">
+            <a:avLst/>
+          </a:prstGeom>
+        </p:spPr>
+      </p:pic>
+    </p:spTree>
+    <p:extLst>
+      <p:ext uri="{BB962C8B-B14F-4D97-AF65-F5344CB8AC3E}">
+        <p14:creationId xmlns:p14="http://schemas.microsoft.com/office/powerpoint/2010/main" val="762418325"/>
+      </p:ext>
+    </p:extLst>
+  </p:cSld>
+  <p:clrMapOvr>
+    <a:masterClrMapping/>
+  </p:clrMapOvr>
+</p:sld>
+</file>
+
+<file path=ppt/slides/slide6.xml><?xml version="1.0" encoding="utf-8"?>
+<p:sld xmlns:a="http://schemas.openxmlformats.org/drawingml/2006/main" xmlns:r="http://schemas.openxmlformats.org/officeDocument/2006/relationships" xmlns:p="http://schemas.openxmlformats.org/presentationml/2006/main">
+  <p:cSld>
+    <p:spTree>
+      <p:nvGrpSpPr>
+        <p:cNvPr id="1" name=""/>
+        <p:cNvGrpSpPr/>
+        <p:nvPr/>
+      </p:nvGrpSpPr>
+      <p:grpSpPr>
+        <a:xfrm>
+          <a:off x="0" y="0"/>
+          <a:ext cx="0" cy="0"/>
+          <a:chOff x="0" y="0"/>
+          <a:chExt cx="0" cy="0"/>
+        </a:xfrm>
+      </p:grpSpPr>
+      <p:pic>
+        <p:nvPicPr>
+          <p:cNvPr id="5" name="Picture 4">
+            <a:extLst>
+              <a:ext uri="{FF2B5EF4-FFF2-40B4-BE49-F238E27FC236}">
+                <a16:creationId xmlns:a16="http://schemas.microsoft.com/office/drawing/2014/main" id="{E38A8B4A-DD5C-43FB-9D93-52E5273D55D7}"/>
+              </a:ext>
+            </a:extLst>
+          </p:cNvPr>
+          <p:cNvPicPr>
+            <a:picLocks noChangeAspect="1"/>
+          </p:cNvPicPr>
+          <p:nvPr/>
+        </p:nvPicPr>
+        <p:blipFill>
+          <a:blip r:embed="rId2">
+            <a:extLst>
+              <a:ext uri="{28A0092B-C50C-407E-A947-70E740481C1C}">
+                <a14:useLocalDpi xmlns:a14="http://schemas.microsoft.com/office/drawing/2010/main" val="0"/>
+              </a:ext>
+            </a:extLst>
+          </a:blip>
+          <a:stretch>
+            <a:fillRect/>
+          </a:stretch>
+        </p:blipFill>
+        <p:spPr>
+          <a:xfrm>
+            <a:off x="381000" y="1042987"/>
+            <a:ext cx="11430000" cy="4772025"/>
+          </a:xfrm>
+          <a:prstGeom prst="rect">
+            <a:avLst/>
+          </a:prstGeom>
+        </p:spPr>
+      </p:pic>
+    </p:spTree>
+    <p:extLst>
+      <p:ext uri="{BB962C8B-B14F-4D97-AF65-F5344CB8AC3E}">
+        <p14:creationId xmlns:p14="http://schemas.microsoft.com/office/powerpoint/2010/main" val="3603837309"/>
+      </p:ext>
+    </p:extLst>
+  </p:cSld>
+  <p:clrMapOvr>
+    <a:masterClrMapping/>
+  </p:clrMapOvr>
+</p:sld>
+</file>
+
+<file path=ppt/slides/slide7.xml><?xml version="1.0" encoding="utf-8"?>
+<p:sld xmlns:a="http://schemas.openxmlformats.org/drawingml/2006/main" xmlns:r="http://schemas.openxmlformats.org/officeDocument/2006/relationships" xmlns:p="http://schemas.openxmlformats.org/presentationml/2006/main">
+  <p:cSld>
+    <p:spTree>
+      <p:nvGrpSpPr>
+        <p:cNvPr id="1" name=""/>
+        <p:cNvGrpSpPr/>
+        <p:nvPr/>
+      </p:nvGrpSpPr>
+      <p:grpSpPr>
+        <a:xfrm>
+          <a:off x="0" y="0"/>
+          <a:ext cx="0" cy="0"/>
+          <a:chOff x="0" y="0"/>
+          <a:chExt cx="0" cy="0"/>
+        </a:xfrm>
+      </p:grpSpPr>
+      <p:pic>
+        <p:nvPicPr>
+          <p:cNvPr id="5" name="Content Placeholder 4">
+            <a:extLst>
+              <a:ext uri="{FF2B5EF4-FFF2-40B4-BE49-F238E27FC236}">
+                <a16:creationId xmlns:a16="http://schemas.microsoft.com/office/drawing/2014/main" id="{98AA3E0C-B353-4E4B-8108-55849A225814}"/>
+              </a:ext>
+            </a:extLst>
+          </p:cNvPr>
+          <p:cNvPicPr>
+            <a:picLocks noGrp="1" noChangeAspect="1"/>
+          </p:cNvPicPr>
+          <p:nvPr>
+            <p:ph idx="1"/>
+          </p:nvPr>
+        </p:nvPicPr>
+        <p:blipFill>
+          <a:blip r:embed="rId2">
+            <a:extLst>
+              <a:ext uri="{28A0092B-C50C-407E-A947-70E740481C1C}">
+                <a14:useLocalDpi xmlns:a14="http://schemas.microsoft.com/office/drawing/2010/main" val="0"/>
+              </a:ext>
+            </a:extLst>
+          </a:blip>
+          <a:stretch>
+            <a:fillRect/>
+          </a:stretch>
+        </p:blipFill>
+        <p:spPr>
+          <a:xfrm>
+            <a:off x="3049554" y="-177864"/>
+            <a:ext cx="5321820" cy="2221860"/>
+          </a:xfrm>
+        </p:spPr>
+      </p:pic>
+      <p:pic>
+        <p:nvPicPr>
+          <p:cNvPr id="7" name="Picture 6">
+            <a:extLst>
+              <a:ext uri="{FF2B5EF4-FFF2-40B4-BE49-F238E27FC236}">
+                <a16:creationId xmlns:a16="http://schemas.microsoft.com/office/drawing/2014/main" id="{5577A8A6-9F33-499D-A736-BCA139488123}"/>
+              </a:ext>
+            </a:extLst>
+          </p:cNvPr>
+          <p:cNvPicPr>
+            <a:picLocks noChangeAspect="1"/>
+          </p:cNvPicPr>
+          <p:nvPr/>
+        </p:nvPicPr>
+        <p:blipFill>
+          <a:blip r:embed="rId3">
+            <a:extLst>
+              <a:ext uri="{28A0092B-C50C-407E-A947-70E740481C1C}">
+                <a14:useLocalDpi xmlns:a14="http://schemas.microsoft.com/office/drawing/2010/main" val="0"/>
+              </a:ext>
+            </a:extLst>
+          </a:blip>
+          <a:stretch>
+            <a:fillRect/>
+          </a:stretch>
+        </p:blipFill>
+        <p:spPr>
+          <a:xfrm>
+            <a:off x="2984240" y="2143211"/>
+            <a:ext cx="5408812" cy="2258179"/>
+          </a:xfrm>
+          <a:prstGeom prst="rect">
+            <a:avLst/>
+          </a:prstGeom>
+        </p:spPr>
+      </p:pic>
+      <p:pic>
+        <p:nvPicPr>
+          <p:cNvPr id="9" name="Picture 8">
+            <a:extLst>
+              <a:ext uri="{FF2B5EF4-FFF2-40B4-BE49-F238E27FC236}">
+                <a16:creationId xmlns:a16="http://schemas.microsoft.com/office/drawing/2014/main" id="{6D2271CA-28A9-4E7B-8EDB-C42773B039BA}"/>
+              </a:ext>
+            </a:extLst>
+          </p:cNvPr>
+          <p:cNvPicPr>
+            <a:picLocks noChangeAspect="1"/>
+          </p:cNvPicPr>
+          <p:nvPr/>
+        </p:nvPicPr>
+        <p:blipFill>
+          <a:blip r:embed="rId4">
+            <a:extLst>
+              <a:ext uri="{28A0092B-C50C-407E-A947-70E740481C1C}">
+                <a14:useLocalDpi xmlns:a14="http://schemas.microsoft.com/office/drawing/2010/main" val="0"/>
+              </a:ext>
+            </a:extLst>
+          </a:blip>
+          <a:stretch>
+            <a:fillRect/>
+          </a:stretch>
+        </p:blipFill>
+        <p:spPr>
+          <a:xfrm>
+            <a:off x="3049554" y="4599821"/>
+            <a:ext cx="5408812" cy="2258179"/>
+          </a:xfrm>
+          <a:prstGeom prst="rect">
+            <a:avLst/>
+          </a:prstGeom>
+        </p:spPr>
+      </p:pic>
+    </p:spTree>
+    <p:extLst>
+      <p:ext uri="{BB962C8B-B14F-4D97-AF65-F5344CB8AC3E}">
+        <p14:creationId xmlns:p14="http://schemas.microsoft.com/office/powerpoint/2010/main" val="787770636"/>
       </p:ext>
     </p:extLst>
   </p:cSld>

</xml_diff>